<commit_message>
reuploading v2 of ppt
</commit_message>
<xml_diff>
--- a/static/images/pitch v2.pptx
+++ b/static/images/pitch v2.pptx
@@ -123,7 +123,7 @@
   <pc:docChgLst>
     <pc:chgData name="McGuire, William" userId="b57b71b3-2582-4369-b5c7-eb94d03fb1e7" providerId="ADAL" clId="{389A940A-33F6-43C3-90C7-3E50C7C84E7E}"/>
     <pc:docChg chg="undo custSel addSld delSld modSld">
-      <pc:chgData name="McGuire, William" userId="b57b71b3-2582-4369-b5c7-eb94d03fb1e7" providerId="ADAL" clId="{389A940A-33F6-43C3-90C7-3E50C7C84E7E}" dt="2018-02-18T11:14:36.629" v="2209" actId="1036"/>
+      <pc:chgData name="McGuire, William" userId="b57b71b3-2582-4369-b5c7-eb94d03fb1e7" providerId="ADAL" clId="{389A940A-33F6-43C3-90C7-3E50C7C84E7E}" dt="2018-02-18T11:19:16.497" v="2221" actId="1036"/>
       <pc:docMkLst>
         <pc:docMk/>
       </pc:docMkLst>
@@ -302,7 +302,7 @@
         </pc:cxnChg>
       </pc:sldChg>
       <pc:sldChg chg="addSp delSp modSp add">
-        <pc:chgData name="McGuire, William" userId="b57b71b3-2582-4369-b5c7-eb94d03fb1e7" providerId="ADAL" clId="{389A940A-33F6-43C3-90C7-3E50C7C84E7E}" dt="2018-02-18T11:09:17.953" v="1724" actId="20577"/>
+        <pc:chgData name="McGuire, William" userId="b57b71b3-2582-4369-b5c7-eb94d03fb1e7" providerId="ADAL" clId="{389A940A-33F6-43C3-90C7-3E50C7C84E7E}" dt="2018-02-18T11:17:52.069" v="2210" actId="2711"/>
         <pc:sldMkLst>
           <pc:docMk/>
           <pc:sldMk cId="3304878646" sldId="258"/>
@@ -380,7 +380,7 @@
           </ac:spMkLst>
         </pc:spChg>
         <pc:spChg chg="add mod">
-          <ac:chgData name="McGuire, William" userId="b57b71b3-2582-4369-b5c7-eb94d03fb1e7" providerId="ADAL" clId="{389A940A-33F6-43C3-90C7-3E50C7C84E7E}" dt="2018-02-18T11:09:17.953" v="1724" actId="20577"/>
+          <ac:chgData name="McGuire, William" userId="b57b71b3-2582-4369-b5c7-eb94d03fb1e7" providerId="ADAL" clId="{389A940A-33F6-43C3-90C7-3E50C7C84E7E}" dt="2018-02-18T11:17:52.069" v="2210" actId="2711"/>
           <ac:spMkLst>
             <pc:docMk/>
             <pc:sldMk cId="3304878646" sldId="258"/>
@@ -388,7 +388,7 @@
           </ac:spMkLst>
         </pc:spChg>
         <pc:spChg chg="add mod">
-          <ac:chgData name="McGuire, William" userId="b57b71b3-2582-4369-b5c7-eb94d03fb1e7" providerId="ADAL" clId="{389A940A-33F6-43C3-90C7-3E50C7C84E7E}" dt="2018-02-18T11:07:01.644" v="1382" actId="20577"/>
+          <ac:chgData name="McGuire, William" userId="b57b71b3-2582-4369-b5c7-eb94d03fb1e7" providerId="ADAL" clId="{389A940A-33F6-43C3-90C7-3E50C7C84E7E}" dt="2018-02-18T11:17:52.069" v="2210" actId="2711"/>
           <ac:spMkLst>
             <pc:docMk/>
             <pc:sldMk cId="3304878646" sldId="258"/>
@@ -396,7 +396,7 @@
           </ac:spMkLst>
         </pc:spChg>
         <pc:spChg chg="add mod">
-          <ac:chgData name="McGuire, William" userId="b57b71b3-2582-4369-b5c7-eb94d03fb1e7" providerId="ADAL" clId="{389A940A-33F6-43C3-90C7-3E50C7C84E7E}" dt="2018-02-18T11:04:48.171" v="1161" actId="20577"/>
+          <ac:chgData name="McGuire, William" userId="b57b71b3-2582-4369-b5c7-eb94d03fb1e7" providerId="ADAL" clId="{389A940A-33F6-43C3-90C7-3E50C7C84E7E}" dt="2018-02-18T11:17:52.069" v="2210" actId="2711"/>
           <ac:spMkLst>
             <pc:docMk/>
             <pc:sldMk cId="3304878646" sldId="258"/>
@@ -619,7 +619,7 @@
         </pc:picChg>
       </pc:sldChg>
       <pc:sldChg chg="addSp delSp modSp add">
-        <pc:chgData name="McGuire, William" userId="b57b71b3-2582-4369-b5c7-eb94d03fb1e7" providerId="ADAL" clId="{389A940A-33F6-43C3-90C7-3E50C7C84E7E}" dt="2018-02-18T10:51:15.211" v="666"/>
+        <pc:chgData name="McGuire, William" userId="b57b71b3-2582-4369-b5c7-eb94d03fb1e7" providerId="ADAL" clId="{389A940A-33F6-43C3-90C7-3E50C7C84E7E}" dt="2018-02-18T11:19:02.707" v="2218" actId="1076"/>
         <pc:sldMkLst>
           <pc:docMk/>
           <pc:sldMk cId="44050594" sldId="261"/>
@@ -641,7 +641,7 @@
           </ac:spMkLst>
         </pc:spChg>
         <pc:spChg chg="mod">
-          <ac:chgData name="McGuire, William" userId="b57b71b3-2582-4369-b5c7-eb94d03fb1e7" providerId="ADAL" clId="{389A940A-33F6-43C3-90C7-3E50C7C84E7E}" dt="2018-02-18T10:51:02.557" v="664" actId="1076"/>
+          <ac:chgData name="McGuire, William" userId="b57b71b3-2582-4369-b5c7-eb94d03fb1e7" providerId="ADAL" clId="{389A940A-33F6-43C3-90C7-3E50C7C84E7E}" dt="2018-02-18T11:19:02.707" v="2218" actId="1076"/>
           <ac:spMkLst>
             <pc:docMk/>
             <pc:sldMk cId="44050594" sldId="261"/>
@@ -649,7 +649,7 @@
           </ac:spMkLst>
         </pc:spChg>
         <pc:spChg chg="mod">
-          <ac:chgData name="McGuire, William" userId="b57b71b3-2582-4369-b5c7-eb94d03fb1e7" providerId="ADAL" clId="{389A940A-33F6-43C3-90C7-3E50C7C84E7E}" dt="2018-02-18T10:50:43.405" v="660" actId="1076"/>
+          <ac:chgData name="McGuire, William" userId="b57b71b3-2582-4369-b5c7-eb94d03fb1e7" providerId="ADAL" clId="{389A940A-33F6-43C3-90C7-3E50C7C84E7E}" dt="2018-02-18T11:19:02.707" v="2218" actId="1076"/>
           <ac:spMkLst>
             <pc:docMk/>
             <pc:sldMk cId="44050594" sldId="261"/>
@@ -665,7 +665,7 @@
           </ac:spMkLst>
         </pc:spChg>
         <pc:spChg chg="mod">
-          <ac:chgData name="McGuire, William" userId="b57b71b3-2582-4369-b5c7-eb94d03fb1e7" providerId="ADAL" clId="{389A940A-33F6-43C3-90C7-3E50C7C84E7E}" dt="2018-02-18T10:50:53.813" v="662" actId="1076"/>
+          <ac:chgData name="McGuire, William" userId="b57b71b3-2582-4369-b5c7-eb94d03fb1e7" providerId="ADAL" clId="{389A940A-33F6-43C3-90C7-3E50C7C84E7E}" dt="2018-02-18T11:19:02.707" v="2218" actId="1076"/>
           <ac:spMkLst>
             <pc:docMk/>
             <pc:sldMk cId="44050594" sldId="261"/>
@@ -746,7 +746,7 @@
         </pc:picChg>
       </pc:sldChg>
       <pc:sldChg chg="addSp delSp modSp add">
-        <pc:chgData name="McGuire, William" userId="b57b71b3-2582-4369-b5c7-eb94d03fb1e7" providerId="ADAL" clId="{389A940A-33F6-43C3-90C7-3E50C7C84E7E}" dt="2018-02-18T10:49:16.957" v="635" actId="1036"/>
+        <pc:chgData name="McGuire, William" userId="b57b71b3-2582-4369-b5c7-eb94d03fb1e7" providerId="ADAL" clId="{389A940A-33F6-43C3-90C7-3E50C7C84E7E}" dt="2018-02-18T11:19:16.497" v="2221" actId="1036"/>
         <pc:sldMkLst>
           <pc:docMk/>
           <pc:sldMk cId="2356741573" sldId="262"/>
@@ -760,7 +760,7 @@
           </ac:spMkLst>
         </pc:spChg>
         <pc:spChg chg="mod">
-          <ac:chgData name="McGuire, William" userId="b57b71b3-2582-4369-b5c7-eb94d03fb1e7" providerId="ADAL" clId="{389A940A-33F6-43C3-90C7-3E50C7C84E7E}" dt="2018-02-18T10:49:16.957" v="635" actId="1036"/>
+          <ac:chgData name="McGuire, William" userId="b57b71b3-2582-4369-b5c7-eb94d03fb1e7" providerId="ADAL" clId="{389A940A-33F6-43C3-90C7-3E50C7C84E7E}" dt="2018-02-18T11:19:16.497" v="2221" actId="1036"/>
           <ac:spMkLst>
             <pc:docMk/>
             <pc:sldMk cId="2356741573" sldId="262"/>
@@ -768,7 +768,7 @@
           </ac:spMkLst>
         </pc:spChg>
         <pc:spChg chg="mod">
-          <ac:chgData name="McGuire, William" userId="b57b71b3-2582-4369-b5c7-eb94d03fb1e7" providerId="ADAL" clId="{389A940A-33F6-43C3-90C7-3E50C7C84E7E}" dt="2018-02-18T10:49:16.957" v="635" actId="1036"/>
+          <ac:chgData name="McGuire, William" userId="b57b71b3-2582-4369-b5c7-eb94d03fb1e7" providerId="ADAL" clId="{389A940A-33F6-43C3-90C7-3E50C7C84E7E}" dt="2018-02-18T11:19:16.497" v="2221" actId="1036"/>
           <ac:spMkLst>
             <pc:docMk/>
             <pc:sldMk cId="2356741573" sldId="262"/>
@@ -784,7 +784,7 @@
           </ac:spMkLst>
         </pc:spChg>
         <pc:spChg chg="mod">
-          <ac:chgData name="McGuire, William" userId="b57b71b3-2582-4369-b5c7-eb94d03fb1e7" providerId="ADAL" clId="{389A940A-33F6-43C3-90C7-3E50C7C84E7E}" dt="2018-02-18T10:49:16.957" v="635" actId="1036"/>
+          <ac:chgData name="McGuire, William" userId="b57b71b3-2582-4369-b5c7-eb94d03fb1e7" providerId="ADAL" clId="{389A940A-33F6-43C3-90C7-3E50C7C84E7E}" dt="2018-02-18T11:19:16.497" v="2221" actId="1036"/>
           <ac:spMkLst>
             <pc:docMk/>
             <pc:sldMk cId="2356741573" sldId="262"/>
@@ -6708,28 +6708,37 @@
           <a:p>
             <a:pPr algn="ctr"/>
             <a:r>
-              <a:rPr lang="en-US" sz="2200" b="1" dirty="0"/>
+              <a:rPr lang="en-US" sz="2200" b="1" dirty="0">
+                <a:latin typeface="Arial Narrow" panose="020B0606020202030204" pitchFamily="34" charset="0"/>
+              </a:rPr>
               <a:t>Workers</a:t>
             </a:r>
           </a:p>
           <a:p>
             <a:pPr algn="ctr"/>
             <a:r>
-              <a:rPr lang="en-US" sz="1500" dirty="0"/>
+              <a:rPr lang="en-US" sz="1500" dirty="0">
+                <a:latin typeface="Arial Narrow" panose="020B0606020202030204" pitchFamily="34" charset="0"/>
+              </a:rPr>
               <a:t>As the trend increases where traditional organizations are leaning more on free lancers, Workspace0</a:t>
             </a:r>
             <a:r>
-              <a:rPr lang="en-US" sz="1500" u="sng" dirty="0"/>
+              <a:rPr lang="en-US" sz="1500" u="sng" dirty="0">
+                <a:latin typeface="Arial Narrow" panose="020B0606020202030204" pitchFamily="34" charset="0"/>
+              </a:rPr>
               <a:t>x</a:t>
             </a:r>
             <a:r>
-              <a:rPr lang="en-US" sz="1500" dirty="0"/>
+              <a:rPr lang="en-US" sz="1500" dirty="0">
+                <a:latin typeface="Arial Narrow" panose="020B0606020202030204" pitchFamily="34" charset="0"/>
+              </a:rPr>
               <a:t> provides an opportunity to scale with stability</a:t>
             </a:r>
             <a:endParaRPr lang="en-US" sz="1500" dirty="0">
               <a:solidFill>
                 <a:srgbClr val="006EBC"/>
               </a:solidFill>
+              <a:latin typeface="Arial Narrow" panose="020B0606020202030204" pitchFamily="34" charset="0"/>
             </a:endParaRPr>
           </a:p>
         </p:txBody>
@@ -6749,7 +6758,7 @@
         <p:spPr>
           <a:xfrm>
             <a:off x="4530753" y="4771731"/>
-            <a:ext cx="3273935" cy="1354217"/>
+            <a:ext cx="3273935" cy="1123384"/>
           </a:xfrm>
           <a:prstGeom prst="rect">
             <a:avLst/>
@@ -6764,14 +6773,18 @@
           <a:p>
             <a:pPr algn="ctr"/>
             <a:r>
-              <a:rPr lang="en-US" sz="2200" b="1" dirty="0"/>
+              <a:rPr lang="en-US" sz="2200" b="1" dirty="0">
+                <a:latin typeface="Arial Narrow" panose="020B0606020202030204" pitchFamily="34" charset="0"/>
+              </a:rPr>
               <a:t>Supply Chain</a:t>
             </a:r>
           </a:p>
           <a:p>
             <a:pPr algn="ctr"/>
             <a:r>
-              <a:rPr lang="en-US" sz="1500" dirty="0"/>
+              <a:rPr lang="en-US" sz="1500" dirty="0">
+                <a:latin typeface="Arial Narrow" panose="020B0606020202030204" pitchFamily="34" charset="0"/>
+              </a:rPr>
               <a:t>As the community grows, employees benefit from the increased leverage for key services such as Medical Insurance, 401(k) and more</a:t>
             </a:r>
           </a:p>
@@ -6807,14 +6820,18 @@
           <a:p>
             <a:pPr algn="ctr"/>
             <a:r>
-              <a:rPr lang="en-US" sz="2200" b="1" dirty="0"/>
+              <a:rPr lang="en-US" sz="2200" b="1" dirty="0">
+                <a:latin typeface="Arial Narrow" panose="020B0606020202030204" pitchFamily="34" charset="0"/>
+              </a:rPr>
               <a:t>Workspaces</a:t>
             </a:r>
           </a:p>
           <a:p>
             <a:pPr algn="ctr"/>
             <a:r>
-              <a:rPr lang="en-US" sz="1500" dirty="0"/>
+              <a:rPr lang="en-US" sz="1500" dirty="0">
+                <a:latin typeface="Arial Narrow" panose="020B0606020202030204" pitchFamily="34" charset="0"/>
+              </a:rPr>
               <a:t>Workspaces can be physical or virtual in nature.  The community votes and decides.</a:t>
             </a:r>
           </a:p>
@@ -7992,8 +8009,8 @@
         </p:nvSpPr>
         <p:spPr>
           <a:xfrm>
-            <a:off x="4436264" y="3908626"/>
-            <a:ext cx="3319472" cy="1938992"/>
+            <a:off x="4436264" y="3747873"/>
+            <a:ext cx="3319472" cy="2308324"/>
           </a:xfrm>
           <a:prstGeom prst="rect">
             <a:avLst/>
@@ -8008,11 +8025,17 @@
           <a:p>
             <a:pPr algn="ctr"/>
             <a:r>
-              <a:rPr lang="en-US" sz="2000" b="1" dirty="0">
+              <a:rPr lang="en-US" sz="2400" b="1" dirty="0">
                 <a:latin typeface="Arial Narrow" panose="020B0606020202030204" pitchFamily="34" charset="0"/>
               </a:rPr>
               <a:t>William McGuire</a:t>
             </a:r>
+          </a:p>
+          <a:p>
+            <a:pPr algn="ctr"/>
+            <a:endParaRPr lang="en-US" sz="2000" dirty="0">
+              <a:latin typeface="Arial Narrow" panose="020B0606020202030204" pitchFamily="34" charset="0"/>
+            </a:endParaRPr>
           </a:p>
           <a:p>
             <a:pPr algn="ctr"/>
@@ -8039,8 +8062,8 @@
         </p:nvSpPr>
         <p:spPr>
           <a:xfrm>
-            <a:off x="8508857" y="3908626"/>
-            <a:ext cx="3319472" cy="1938992"/>
+            <a:off x="8508857" y="3747873"/>
+            <a:ext cx="3319472" cy="2308324"/>
           </a:xfrm>
           <a:prstGeom prst="rect">
             <a:avLst/>
@@ -8055,24 +8078,30 @@
           <a:p>
             <a:pPr algn="ctr"/>
             <a:r>
-              <a:rPr lang="en-US" sz="2000" b="1" dirty="0" err="1">
+              <a:rPr lang="en-US" sz="2400" b="1" dirty="0" err="1">
                 <a:latin typeface="Arial Narrow" panose="020B0606020202030204" pitchFamily="34" charset="0"/>
               </a:rPr>
               <a:t>Betina</a:t>
             </a:r>
             <a:r>
-              <a:rPr lang="en-US" sz="2000" b="1" dirty="0">
+              <a:rPr lang="en-US" sz="2400" b="1" dirty="0">
                 <a:latin typeface="Arial Narrow" panose="020B0606020202030204" pitchFamily="34" charset="0"/>
               </a:rPr>
               <a:t> </a:t>
             </a:r>
             <a:r>
-              <a:rPr lang="en-US" sz="2000" b="1" dirty="0" err="1">
+              <a:rPr lang="en-US" sz="2400" b="1" dirty="0" err="1">
                 <a:latin typeface="Arial Narrow" panose="020B0606020202030204" pitchFamily="34" charset="0"/>
               </a:rPr>
               <a:t>Schnepf</a:t>
             </a:r>
-            <a:endParaRPr lang="en-US" sz="2000" b="1" dirty="0">
+            <a:endParaRPr lang="en-US" sz="2400" b="1" dirty="0">
+              <a:latin typeface="Arial Narrow" panose="020B0606020202030204" pitchFamily="34" charset="0"/>
+            </a:endParaRPr>
+          </a:p>
+          <a:p>
+            <a:pPr algn="ctr"/>
+            <a:endParaRPr lang="en-US" sz="2000" dirty="0">
               <a:latin typeface="Arial Narrow" panose="020B0606020202030204" pitchFamily="34" charset="0"/>
             </a:endParaRPr>
           </a:p>
@@ -8107,8 +8136,8 @@
         </p:nvSpPr>
         <p:spPr>
           <a:xfrm>
-            <a:off x="598623" y="3908626"/>
-            <a:ext cx="3319472" cy="1938992"/>
+            <a:off x="598623" y="3747873"/>
+            <a:ext cx="3319472" cy="2308324"/>
           </a:xfrm>
           <a:prstGeom prst="rect">
             <a:avLst/>
@@ -8123,18 +8152,24 @@
           <a:p>
             <a:pPr algn="ctr"/>
             <a:r>
-              <a:rPr lang="en-US" sz="2000" b="1" dirty="0">
+              <a:rPr lang="en-US" sz="2400" b="1" dirty="0">
                 <a:latin typeface="Arial Narrow" panose="020B0606020202030204" pitchFamily="34" charset="0"/>
               </a:rPr>
               <a:t>Michael </a:t>
             </a:r>
             <a:r>
-              <a:rPr lang="en-US" sz="2000" b="1" dirty="0" err="1">
+              <a:rPr lang="en-US" sz="2400" b="1" dirty="0" err="1">
                 <a:latin typeface="Arial Narrow" panose="020B0606020202030204" pitchFamily="34" charset="0"/>
               </a:rPr>
               <a:t>Nolivos</a:t>
             </a:r>
-            <a:endParaRPr lang="en-US" sz="2000" b="1" dirty="0">
+            <a:endParaRPr lang="en-US" sz="2400" b="1" dirty="0">
+              <a:latin typeface="Arial Narrow" panose="020B0606020202030204" pitchFamily="34" charset="0"/>
+            </a:endParaRPr>
+          </a:p>
+          <a:p>
+            <a:pPr algn="ctr"/>
+            <a:endParaRPr lang="en-US" sz="2000" dirty="0">
               <a:latin typeface="Arial Narrow" panose="020B0606020202030204" pitchFamily="34" charset="0"/>
             </a:endParaRPr>
           </a:p>
@@ -8642,7 +8677,7 @@
         </p:nvSpPr>
         <p:spPr>
           <a:xfrm>
-            <a:off x="4310743" y="4174273"/>
+            <a:off x="4310743" y="4206931"/>
             <a:ext cx="3460765" cy="1938992"/>
           </a:xfrm>
           <a:prstGeom prst="rect">
@@ -8689,7 +8724,7 @@
         </p:nvSpPr>
         <p:spPr>
           <a:xfrm>
-            <a:off x="8262257" y="4173180"/>
+            <a:off x="8262257" y="4205838"/>
             <a:ext cx="3809107" cy="2554545"/>
           </a:xfrm>
           <a:prstGeom prst="rect">
@@ -8736,7 +8771,7 @@
         </p:nvSpPr>
         <p:spPr>
           <a:xfrm>
-            <a:off x="304800" y="4218909"/>
+            <a:off x="304800" y="4251567"/>
             <a:ext cx="3613295" cy="1631216"/>
           </a:xfrm>
           <a:prstGeom prst="rect">

</xml_diff>